<commit_message>
improve decks and demos“
</commit_message>
<xml_diff>
--- a/capsnet/CapsNet.pptx
+++ b/capsnet/CapsNet.pptx
@@ -5,19 +5,20 @@
     <p:sldMasterId id="2147483648" r:id="rId1"/>
   </p:sldMasterIdLst>
   <p:notesMasterIdLst>
-    <p:notesMasterId r:id="rId12"/>
+    <p:notesMasterId r:id="rId13"/>
   </p:notesMasterIdLst>
   <p:sldIdLst>
     <p:sldId id="256" r:id="rId2"/>
     <p:sldId id="257" r:id="rId3"/>
-    <p:sldId id="259" r:id="rId4"/>
-    <p:sldId id="258" r:id="rId5"/>
-    <p:sldId id="263" r:id="rId6"/>
-    <p:sldId id="264" r:id="rId7"/>
+    <p:sldId id="266" r:id="rId4"/>
+    <p:sldId id="259" r:id="rId5"/>
+    <p:sldId id="258" r:id="rId6"/>
+    <p:sldId id="263" r:id="rId7"/>
     <p:sldId id="265" r:id="rId8"/>
-    <p:sldId id="260" r:id="rId9"/>
-    <p:sldId id="261" r:id="rId10"/>
-    <p:sldId id="262" r:id="rId11"/>
+    <p:sldId id="264" r:id="rId9"/>
+    <p:sldId id="260" r:id="rId10"/>
+    <p:sldId id="261" r:id="rId11"/>
+    <p:sldId id="262" r:id="rId12"/>
   </p:sldIdLst>
   <p:sldSz cx="12192000" cy="6858000"/>
   <p:notesSz cx="6858000" cy="9144000"/>
@@ -632,6 +633,90 @@
     </p:spTree>
     <p:extLst>
       <p:ext uri="{BB962C8B-B14F-4D97-AF65-F5344CB8AC3E}">
+        <p14:creationId xmlns:p14="http://schemas.microsoft.com/office/powerpoint/2010/main" val="429936294"/>
+      </p:ext>
+    </p:extLst>
+  </p:cSld>
+  <p:clrMapOvr>
+    <a:masterClrMapping/>
+  </p:clrMapOvr>
+</p:notes>
+</file>
+
+<file path=ppt/notesSlides/notesSlide11.xml><?xml version="1.0" encoding="utf-8"?>
+<p:notes xmlns:a="http://schemas.openxmlformats.org/drawingml/2006/main" xmlns:r="http://schemas.openxmlformats.org/officeDocument/2006/relationships" xmlns:p="http://schemas.openxmlformats.org/presentationml/2006/main">
+  <p:cSld>
+    <p:spTree>
+      <p:nvGrpSpPr>
+        <p:cNvPr id="1" name=""/>
+        <p:cNvGrpSpPr/>
+        <p:nvPr/>
+      </p:nvGrpSpPr>
+      <p:grpSpPr>
+        <a:xfrm>
+          <a:off x="0" y="0"/>
+          <a:ext cx="0" cy="0"/>
+          <a:chOff x="0" y="0"/>
+          <a:chExt cx="0" cy="0"/>
+        </a:xfrm>
+      </p:grpSpPr>
+      <p:sp>
+        <p:nvSpPr>
+          <p:cNvPr id="2" name="Slide Image Placeholder 1"/>
+          <p:cNvSpPr>
+            <a:spLocks noGrp="1" noRot="1" noChangeAspect="1"/>
+          </p:cNvSpPr>
+          <p:nvPr>
+            <p:ph type="sldImg"/>
+          </p:nvPr>
+        </p:nvSpPr>
+        <p:spPr/>
+      </p:sp>
+      <p:sp>
+        <p:nvSpPr>
+          <p:cNvPr id="3" name="Notes Placeholder 2"/>
+          <p:cNvSpPr>
+            <a:spLocks noGrp="1"/>
+          </p:cNvSpPr>
+          <p:nvPr>
+            <p:ph type="body" idx="1"/>
+          </p:nvPr>
+        </p:nvSpPr>
+        <p:spPr/>
+        <p:txBody>
+          <a:bodyPr/>
+          <a:lstStyle/>
+          <a:p>
+            <a:endParaRPr lang="en-US"/>
+          </a:p>
+        </p:txBody>
+      </p:sp>
+      <p:sp>
+        <p:nvSpPr>
+          <p:cNvPr id="4" name="Slide Number Placeholder 3"/>
+          <p:cNvSpPr>
+            <a:spLocks noGrp="1"/>
+          </p:cNvSpPr>
+          <p:nvPr>
+            <p:ph type="sldNum" sz="quarter" idx="10"/>
+          </p:nvPr>
+        </p:nvSpPr>
+        <p:spPr/>
+        <p:txBody>
+          <a:bodyPr/>
+          <a:lstStyle/>
+          <a:p>
+            <a:fld id="{661F67E5-A495-4EE2-9C93-63006194F00D}" type="slidenum">
+              <a:rPr lang="en-US" smtClean="0"/>
+              <a:t>11</a:t>
+            </a:fld>
+            <a:endParaRPr lang="en-US"/>
+          </a:p>
+        </p:txBody>
+      </p:sp>
+    </p:spTree>
+    <p:extLst>
+      <p:ext uri="{BB962C8B-B14F-4D97-AF65-F5344CB8AC3E}">
         <p14:creationId xmlns:p14="http://schemas.microsoft.com/office/powerpoint/2010/main" val="676933539"/>
       </p:ext>
     </p:extLst>
@@ -770,7 +855,7 @@
           <a:bodyPr/>
           <a:lstStyle/>
           <a:p>
-            <a:endParaRPr lang="en-US"/>
+            <a:endParaRPr lang="en-US" dirty="0"/>
           </a:p>
         </p:txBody>
       </p:sp>
@@ -800,7 +885,7 @@
     </p:spTree>
     <p:extLst>
       <p:ext uri="{BB962C8B-B14F-4D97-AF65-F5344CB8AC3E}">
-        <p14:creationId xmlns:p14="http://schemas.microsoft.com/office/powerpoint/2010/main" val="4060347362"/>
+        <p14:creationId xmlns:p14="http://schemas.microsoft.com/office/powerpoint/2010/main" val="406545674"/>
       </p:ext>
     </p:extLst>
   </p:cSld>
@@ -854,172 +939,7 @@
           <a:bodyPr/>
           <a:lstStyle/>
           <a:p>
-            <a:r>
-              <a:rPr lang="en-US" sz="1200" b="0" i="0" kern="1200" dirty="0" smtClean="0">
-                <a:solidFill>
-                  <a:schemeClr val="tx1"/>
-                </a:solidFill>
-                <a:effectLst/>
-                <a:latin typeface="+mn-lt"/>
-                <a:ea typeface="+mn-ea"/>
-                <a:cs typeface="+mn-cs"/>
-              </a:rPr>
-              <a:t>Hinton </a:t>
-            </a:r>
-            <a:r>
-              <a:rPr lang="zh-CN" altLang="en-US" sz="1200" b="0" i="0" kern="1200" dirty="0" smtClean="0">
-                <a:solidFill>
-                  <a:schemeClr val="tx1"/>
-                </a:solidFill>
-                <a:effectLst/>
-                <a:latin typeface="+mn-lt"/>
-                <a:ea typeface="+mn-ea"/>
-                <a:cs typeface="+mn-cs"/>
-              </a:rPr>
-              <a:t>自己就表示：</a:t>
-            </a:r>
-            <a:endParaRPr lang="en-US" altLang="zh-CN" sz="1200" b="0" i="0" kern="1200" dirty="0" smtClean="0">
-              <a:solidFill>
-                <a:schemeClr val="tx1"/>
-              </a:solidFill>
-              <a:effectLst/>
-              <a:latin typeface="+mn-lt"/>
-              <a:ea typeface="+mn-ea"/>
-              <a:cs typeface="+mn-cs"/>
-            </a:endParaRPr>
-          </a:p>
-          <a:p>
-            <a:r>
-              <a:rPr lang="zh-CN" altLang="en-US" sz="1200" b="0" i="0" kern="1200" dirty="0" smtClean="0">
-                <a:solidFill>
-                  <a:schemeClr val="tx1"/>
-                </a:solidFill>
-                <a:effectLst/>
-                <a:latin typeface="+mn-lt"/>
-                <a:ea typeface="+mn-ea"/>
-                <a:cs typeface="+mn-cs"/>
-              </a:rPr>
-              <a:t>“卷积神经网络使用的池化操作是一个巨大的错误，它表现如此优异则是一场灾难。”</a:t>
-            </a:r>
-            <a:endParaRPr lang="en-US" altLang="zh-CN" sz="1200" b="0" i="0" kern="1200" dirty="0" smtClean="0">
-              <a:solidFill>
-                <a:schemeClr val="tx1"/>
-              </a:solidFill>
-              <a:effectLst/>
-              <a:latin typeface="+mn-lt"/>
-              <a:ea typeface="+mn-ea"/>
-              <a:cs typeface="+mn-cs"/>
-            </a:endParaRPr>
-          </a:p>
-          <a:p>
-            <a:r>
-              <a:rPr lang="en-US" sz="1200" b="0" i="1" kern="1200" dirty="0" smtClean="0">
-                <a:solidFill>
-                  <a:schemeClr val="tx1"/>
-                </a:solidFill>
-                <a:effectLst/>
-                <a:latin typeface="+mn-lt"/>
-                <a:ea typeface="+mn-ea"/>
-                <a:cs typeface="+mn-cs"/>
-              </a:rPr>
-              <a:t>Hinton: “The pooling operation used in convolutional neural networks is a big mistake and the fact that it works so well is a disaster.”</a:t>
-            </a:r>
-            <a:endParaRPr lang="en-US" altLang="zh-CN" sz="1200" b="0" i="0" kern="1200" dirty="0" smtClean="0">
-              <a:solidFill>
-                <a:schemeClr val="tx1"/>
-              </a:solidFill>
-              <a:effectLst/>
-              <a:latin typeface="+mn-lt"/>
-              <a:ea typeface="+mn-ea"/>
-              <a:cs typeface="+mn-cs"/>
-            </a:endParaRPr>
-          </a:p>
-          <a:p>
-            <a:endParaRPr lang="en-US" altLang="zh-CN" sz="1200" b="0" i="0" kern="1200" dirty="0" smtClean="0">
-              <a:solidFill>
-                <a:schemeClr val="tx1"/>
-              </a:solidFill>
-              <a:effectLst/>
-              <a:latin typeface="+mn-lt"/>
-              <a:ea typeface="+mn-ea"/>
-              <a:cs typeface="+mn-cs"/>
-            </a:endParaRPr>
-          </a:p>
-          <a:p>
-            <a:r>
-              <a:rPr lang="zh-CN" altLang="en-US" sz="1200" b="0" i="0" kern="1200" dirty="0" smtClean="0">
-                <a:solidFill>
-                  <a:schemeClr val="tx1"/>
-                </a:solidFill>
-                <a:effectLst/>
-                <a:latin typeface="+mn-lt"/>
-                <a:ea typeface="+mn-ea"/>
-                <a:cs typeface="+mn-cs"/>
-              </a:rPr>
-              <a:t>即使不使用最大池化，然而这仍旧没有解决一个关键问题：</a:t>
-            </a:r>
-            <a:endParaRPr lang="en-US" altLang="zh-CN" sz="1200" b="0" i="0" kern="1200" dirty="0" smtClean="0">
-              <a:solidFill>
-                <a:schemeClr val="tx1"/>
-              </a:solidFill>
-              <a:effectLst/>
-              <a:latin typeface="+mn-lt"/>
-              <a:ea typeface="+mn-ea"/>
-              <a:cs typeface="+mn-cs"/>
-            </a:endParaRPr>
-          </a:p>
-          <a:p>
-            <a:r>
-              <a:rPr lang="en-US" sz="1200" b="0" i="0" kern="1200" dirty="0" smtClean="0">
-                <a:solidFill>
-                  <a:schemeClr val="tx1"/>
-                </a:solidFill>
-                <a:effectLst/>
-                <a:latin typeface="+mn-lt"/>
-                <a:ea typeface="+mn-ea"/>
-                <a:cs typeface="+mn-cs"/>
-              </a:rPr>
-              <a:t>“</a:t>
-            </a:r>
-            <a:r>
-              <a:rPr lang="zh-CN" altLang="en-US" sz="1200" b="0" i="0" kern="1200" dirty="0" smtClean="0">
-                <a:solidFill>
-                  <a:schemeClr val="tx1"/>
-                </a:solidFill>
-                <a:effectLst/>
-                <a:latin typeface="+mn-lt"/>
-                <a:ea typeface="+mn-ea"/>
-                <a:cs typeface="+mn-cs"/>
-              </a:rPr>
-              <a:t>卷积神经网络的内部数据表示没有考虑简单和复杂对象之间的重要空间层级。</a:t>
-            </a:r>
-            <a:r>
-              <a:rPr lang="en-US" sz="1200" b="0" i="0" kern="1200" dirty="0" smtClean="0">
-                <a:solidFill>
-                  <a:schemeClr val="tx1"/>
-                </a:solidFill>
-                <a:effectLst/>
-                <a:latin typeface="+mn-lt"/>
-                <a:ea typeface="+mn-ea"/>
-                <a:cs typeface="+mn-cs"/>
-              </a:rPr>
-              <a:t>”</a:t>
-            </a:r>
-          </a:p>
-          <a:p>
-            <a:r>
-              <a:rPr lang="en-US" sz="1200" b="0" i="1" kern="1200" dirty="0" smtClean="0">
-                <a:solidFill>
-                  <a:schemeClr val="tx1"/>
-                </a:solidFill>
-                <a:effectLst/>
-                <a:latin typeface="+mn-lt"/>
-                <a:ea typeface="+mn-ea"/>
-                <a:cs typeface="+mn-cs"/>
-              </a:rPr>
-              <a:t>Internal data representation of a convolutional neural network does not take into account important spatial hierarchies between simple and complex objects.</a:t>
-            </a:r>
-            <a:endParaRPr lang="en-US" dirty="0"/>
+            <a:endParaRPr lang="en-US"/>
           </a:p>
         </p:txBody>
       </p:sp>
@@ -1049,7 +969,7 @@
     </p:spTree>
     <p:extLst>
       <p:ext uri="{BB962C8B-B14F-4D97-AF65-F5344CB8AC3E}">
-        <p14:creationId xmlns:p14="http://schemas.microsoft.com/office/powerpoint/2010/main" val="2175830299"/>
+        <p14:creationId xmlns:p14="http://schemas.microsoft.com/office/powerpoint/2010/main" val="4060347362"/>
       </p:ext>
     </p:extLst>
   </p:cSld>
@@ -1104,6 +1024,18 @@
           <a:lstStyle/>
           <a:p>
             <a:r>
+              <a:rPr lang="en-US" sz="1200" b="0" i="0" kern="1200" dirty="0" smtClean="0">
+                <a:solidFill>
+                  <a:schemeClr val="tx1"/>
+                </a:solidFill>
+                <a:effectLst/>
+                <a:latin typeface="+mn-lt"/>
+                <a:ea typeface="+mn-ea"/>
+                <a:cs typeface="+mn-cs"/>
+              </a:rPr>
+              <a:t>Hinton </a:t>
+            </a:r>
+            <a:r>
               <a:rPr lang="zh-CN" altLang="en-US" sz="1200" b="0" i="0" kern="1200" dirty="0" smtClean="0">
                 <a:solidFill>
                   <a:schemeClr val="tx1"/>
@@ -1113,7 +1045,212 @@
                 <a:ea typeface="+mn-ea"/>
                 <a:cs typeface="+mn-cs"/>
               </a:rPr>
-              <a:t>你可以轻易辨识出这是自由女神像，尽管所有的图像显示的角度都不一样。这是因为你脑中的自由女神像的内部表示并不依赖视角。</a:t>
+              <a:t>自己就表示：</a:t>
+            </a:r>
+            <a:endParaRPr lang="en-US" altLang="zh-CN" sz="1200" b="0" i="0" kern="1200" dirty="0" smtClean="0">
+              <a:solidFill>
+                <a:schemeClr val="tx1"/>
+              </a:solidFill>
+              <a:effectLst/>
+              <a:latin typeface="+mn-lt"/>
+              <a:ea typeface="+mn-ea"/>
+              <a:cs typeface="+mn-cs"/>
+            </a:endParaRPr>
+          </a:p>
+          <a:p>
+            <a:r>
+              <a:rPr lang="zh-CN" altLang="en-US" sz="1200" b="0" i="0" kern="1200" dirty="0" smtClean="0">
+                <a:solidFill>
+                  <a:schemeClr val="tx1"/>
+                </a:solidFill>
+                <a:effectLst/>
+                <a:latin typeface="+mn-lt"/>
+                <a:ea typeface="+mn-ea"/>
+                <a:cs typeface="+mn-cs"/>
+              </a:rPr>
+              <a:t>“卷积神经网络使用的池化操作是一个巨大的错误，它表现如此优异则是一场灾难。”</a:t>
+            </a:r>
+            <a:endParaRPr lang="en-US" altLang="zh-CN" sz="1200" b="0" i="0" kern="1200" dirty="0" smtClean="0">
+              <a:solidFill>
+                <a:schemeClr val="tx1"/>
+              </a:solidFill>
+              <a:effectLst/>
+              <a:latin typeface="+mn-lt"/>
+              <a:ea typeface="+mn-ea"/>
+              <a:cs typeface="+mn-cs"/>
+            </a:endParaRPr>
+          </a:p>
+          <a:p>
+            <a:r>
+              <a:rPr lang="en-US" sz="1200" b="0" i="1" kern="1200" dirty="0" smtClean="0">
+                <a:solidFill>
+                  <a:schemeClr val="tx1"/>
+                </a:solidFill>
+                <a:effectLst/>
+                <a:latin typeface="+mn-lt"/>
+                <a:ea typeface="+mn-ea"/>
+                <a:cs typeface="+mn-cs"/>
+              </a:rPr>
+              <a:t>Hinton: “The pooling operation used in convolutional neural networks is a big mistake and the fact that it works so well is a disaster.”</a:t>
+            </a:r>
+            <a:endParaRPr lang="en-US" altLang="zh-CN" sz="1200" b="0" i="0" kern="1200" dirty="0" smtClean="0">
+              <a:solidFill>
+                <a:schemeClr val="tx1"/>
+              </a:solidFill>
+              <a:effectLst/>
+              <a:latin typeface="+mn-lt"/>
+              <a:ea typeface="+mn-ea"/>
+              <a:cs typeface="+mn-cs"/>
+            </a:endParaRPr>
+          </a:p>
+          <a:p>
+            <a:endParaRPr lang="en-US" altLang="zh-CN" sz="1200" b="0" i="0" kern="1200" dirty="0" smtClean="0">
+              <a:solidFill>
+                <a:schemeClr val="tx1"/>
+              </a:solidFill>
+              <a:effectLst/>
+              <a:latin typeface="+mn-lt"/>
+              <a:ea typeface="+mn-ea"/>
+              <a:cs typeface="+mn-cs"/>
+            </a:endParaRPr>
+          </a:p>
+          <a:p>
+            <a:r>
+              <a:rPr lang="zh-CN" altLang="en-US" sz="1200" b="0" i="0" kern="1200" dirty="0" smtClean="0">
+                <a:solidFill>
+                  <a:schemeClr val="tx1"/>
+                </a:solidFill>
+                <a:effectLst/>
+                <a:latin typeface="+mn-lt"/>
+                <a:ea typeface="+mn-ea"/>
+                <a:cs typeface="+mn-cs"/>
+              </a:rPr>
+              <a:t>即使不使用最大池化，然而这仍旧没有解决一个关键问题：</a:t>
+            </a:r>
+            <a:endParaRPr lang="en-US" altLang="zh-CN" sz="1200" b="0" i="0" kern="1200" dirty="0" smtClean="0">
+              <a:solidFill>
+                <a:schemeClr val="tx1"/>
+              </a:solidFill>
+              <a:effectLst/>
+              <a:latin typeface="+mn-lt"/>
+              <a:ea typeface="+mn-ea"/>
+              <a:cs typeface="+mn-cs"/>
+            </a:endParaRPr>
+          </a:p>
+          <a:p>
+            <a:r>
+              <a:rPr lang="en-US" sz="1200" b="0" i="0" kern="1200" dirty="0" smtClean="0">
+                <a:solidFill>
+                  <a:schemeClr val="tx1"/>
+                </a:solidFill>
+                <a:effectLst/>
+                <a:latin typeface="+mn-lt"/>
+                <a:ea typeface="+mn-ea"/>
+                <a:cs typeface="+mn-cs"/>
+              </a:rPr>
+              <a:t>“</a:t>
+            </a:r>
+            <a:r>
+              <a:rPr lang="zh-CN" altLang="en-US" sz="1200" b="0" i="0" kern="1200" dirty="0" smtClean="0">
+                <a:solidFill>
+                  <a:schemeClr val="tx1"/>
+                </a:solidFill>
+                <a:effectLst/>
+                <a:latin typeface="+mn-lt"/>
+                <a:ea typeface="+mn-ea"/>
+                <a:cs typeface="+mn-cs"/>
+              </a:rPr>
+              <a:t>卷积神经网络的内部数据表示没有考虑简单和复杂对象之间的重要空间层级。</a:t>
+            </a:r>
+            <a:r>
+              <a:rPr lang="en-US" sz="1200" b="0" i="0" kern="1200" dirty="0" smtClean="0">
+                <a:solidFill>
+                  <a:schemeClr val="tx1"/>
+                </a:solidFill>
+                <a:effectLst/>
+                <a:latin typeface="+mn-lt"/>
+                <a:ea typeface="+mn-ea"/>
+                <a:cs typeface="+mn-cs"/>
+              </a:rPr>
+              <a:t>”</a:t>
+            </a:r>
+          </a:p>
+          <a:p>
+            <a:r>
+              <a:rPr lang="en-US" sz="1200" b="0" i="1" kern="1200" dirty="0" smtClean="0">
+                <a:solidFill>
+                  <a:schemeClr val="tx1"/>
+                </a:solidFill>
+                <a:effectLst/>
+                <a:latin typeface="+mn-lt"/>
+                <a:ea typeface="+mn-ea"/>
+                <a:cs typeface="+mn-cs"/>
+              </a:rPr>
+              <a:t>Internal data representation of a convolutional neural network does not take into account important spatial hierarchies between simple and complex objects</a:t>
+            </a:r>
+            <a:r>
+              <a:rPr lang="en-US" sz="1200" b="0" i="1" kern="1200" dirty="0" smtClean="0">
+                <a:solidFill>
+                  <a:schemeClr val="tx1"/>
+                </a:solidFill>
+                <a:effectLst/>
+                <a:latin typeface="+mn-lt"/>
+                <a:ea typeface="+mn-ea"/>
+                <a:cs typeface="+mn-cs"/>
+              </a:rPr>
+              <a:t>.</a:t>
+            </a:r>
+          </a:p>
+          <a:p>
+            <a:endParaRPr lang="en-US" sz="1200" b="0" i="1" kern="1200" dirty="0" smtClean="0">
+              <a:solidFill>
+                <a:schemeClr val="tx1"/>
+              </a:solidFill>
+              <a:effectLst/>
+              <a:latin typeface="+mn-lt"/>
+              <a:ea typeface="+mn-ea"/>
+              <a:cs typeface="+mn-cs"/>
+            </a:endParaRPr>
+          </a:p>
+          <a:p>
+            <a:r>
+              <a:rPr lang="en-US" altLang="zh-CN" sz="1200" b="0" i="1" kern="1200" dirty="0" smtClean="0">
+                <a:solidFill>
+                  <a:schemeClr val="tx1"/>
+                </a:solidFill>
+                <a:effectLst/>
+                <a:latin typeface="+mn-lt"/>
+                <a:ea typeface="+mn-ea"/>
+                <a:cs typeface="+mn-cs"/>
+              </a:rPr>
+              <a:t>Geoffrey Hinton</a:t>
+            </a:r>
+            <a:r>
+              <a:rPr lang="en-US" altLang="zh-CN" sz="1200" b="0" i="1" kern="1200" baseline="0" dirty="0" smtClean="0">
+                <a:solidFill>
+                  <a:schemeClr val="tx1"/>
+                </a:solidFill>
+                <a:effectLst/>
+                <a:latin typeface="+mn-lt"/>
+                <a:ea typeface="+mn-ea"/>
+                <a:cs typeface="+mn-cs"/>
+              </a:rPr>
+              <a:t> talk “What is wrong with convolutional neural nets ?”</a:t>
+            </a:r>
+            <a:endParaRPr lang="en-US" sz="1200" b="0" i="1" kern="1200" dirty="0" smtClean="0">
+              <a:solidFill>
+                <a:schemeClr val="tx1"/>
+              </a:solidFill>
+              <a:effectLst/>
+              <a:latin typeface="+mn-lt"/>
+              <a:ea typeface="+mn-ea"/>
+              <a:cs typeface="+mn-cs"/>
+            </a:endParaRPr>
+          </a:p>
+          <a:p>
+            <a:r>
+              <a:rPr lang="en-US" dirty="0" smtClean="0"/>
+              <a:t>https://www.youtube.com/watch?v=rTawFwUvnLE</a:t>
             </a:r>
             <a:endParaRPr lang="en-US" dirty="0"/>
           </a:p>
@@ -1145,7 +1282,7 @@
     </p:spTree>
     <p:extLst>
       <p:ext uri="{BB962C8B-B14F-4D97-AF65-F5344CB8AC3E}">
-        <p14:creationId xmlns:p14="http://schemas.microsoft.com/office/powerpoint/2010/main" val="3568351954"/>
+        <p14:creationId xmlns:p14="http://schemas.microsoft.com/office/powerpoint/2010/main" val="2175830299"/>
       </p:ext>
     </p:extLst>
   </p:cSld>
@@ -1199,7 +1336,19 @@
           <a:bodyPr/>
           <a:lstStyle/>
           <a:p>
-            <a:endParaRPr lang="en-US"/>
+            <a:r>
+              <a:rPr lang="zh-CN" altLang="en-US" sz="1200" b="0" i="0" kern="1200" dirty="0" smtClean="0">
+                <a:solidFill>
+                  <a:schemeClr val="tx1"/>
+                </a:solidFill>
+                <a:effectLst/>
+                <a:latin typeface="+mn-lt"/>
+                <a:ea typeface="+mn-ea"/>
+                <a:cs typeface="+mn-cs"/>
+              </a:rPr>
+              <a:t>你可以轻易辨识出这是自由女神像，尽管所有的图像显示的角度都不一样。这是因为你脑中的自由女神像的内部表示并不依赖视角。</a:t>
+            </a:r>
+            <a:endParaRPr lang="en-US" dirty="0"/>
           </a:p>
         </p:txBody>
       </p:sp>
@@ -1229,7 +1378,7 @@
     </p:spTree>
     <p:extLst>
       <p:ext uri="{BB962C8B-B14F-4D97-AF65-F5344CB8AC3E}">
-        <p14:creationId xmlns:p14="http://schemas.microsoft.com/office/powerpoint/2010/main" val="1713514848"/>
+        <p14:creationId xmlns:p14="http://schemas.microsoft.com/office/powerpoint/2010/main" val="3568351954"/>
       </p:ext>
     </p:extLst>
   </p:cSld>
@@ -1367,35 +1516,7 @@
           <a:bodyPr/>
           <a:lstStyle/>
           <a:p>
-            <a:r>
-              <a:rPr lang="zh-CN" altLang="en-US" dirty="0" smtClean="0"/>
-              <a:t>胶囊理论实际上更接近人脑的</a:t>
-            </a:r>
-            <a:r>
-              <a:rPr lang="zh-CN" altLang="en-US" sz="1200" b="0" i="0" kern="1200" dirty="0" smtClean="0">
-                <a:solidFill>
-                  <a:schemeClr val="tx1"/>
-                </a:solidFill>
-                <a:effectLst/>
-                <a:latin typeface="+mn-lt"/>
-                <a:ea typeface="+mn-ea"/>
-                <a:cs typeface="+mn-cs"/>
-              </a:rPr>
-              <a:t>这看起来像是在暴力破解，显然要比我们的大脑低级。</a:t>
-            </a:r>
-            <a:r>
-              <a:rPr lang="zh-CN" altLang="en-US" dirty="0" smtClean="0"/>
-              <a:t>行为。为了学会区分数字，人脑只需要几十个例子，最多几百个例子。而</a:t>
-            </a:r>
-            <a:r>
-              <a:rPr lang="en-US" altLang="zh-CN" dirty="0" smtClean="0"/>
-              <a:t>CNN</a:t>
-            </a:r>
-            <a:r>
-              <a:rPr lang="zh-CN" altLang="en-US" dirty="0" smtClean="0"/>
-              <a:t>则需要几万个例子才能取得很好的效果。</a:t>
-            </a:r>
-            <a:endParaRPr lang="en-US" dirty="0"/>
+            <a:endParaRPr lang="en-US"/>
           </a:p>
         </p:txBody>
       </p:sp>
@@ -1425,7 +1546,7 @@
     </p:spTree>
     <p:extLst>
       <p:ext uri="{BB962C8B-B14F-4D97-AF65-F5344CB8AC3E}">
-        <p14:creationId xmlns:p14="http://schemas.microsoft.com/office/powerpoint/2010/main" val="298515564"/>
+        <p14:creationId xmlns:p14="http://schemas.microsoft.com/office/powerpoint/2010/main" val="1713514848"/>
       </p:ext>
     </p:extLst>
   </p:cSld>
@@ -1479,7 +1600,35 @@
           <a:bodyPr/>
           <a:lstStyle/>
           <a:p>
-            <a:endParaRPr lang="en-US"/>
+            <a:r>
+              <a:rPr lang="zh-CN" altLang="en-US" dirty="0" smtClean="0"/>
+              <a:t>胶囊理论实际上更接近人脑的</a:t>
+            </a:r>
+            <a:r>
+              <a:rPr lang="zh-CN" altLang="en-US" sz="1200" b="0" i="0" kern="1200" dirty="0" smtClean="0">
+                <a:solidFill>
+                  <a:schemeClr val="tx1"/>
+                </a:solidFill>
+                <a:effectLst/>
+                <a:latin typeface="+mn-lt"/>
+                <a:ea typeface="+mn-ea"/>
+                <a:cs typeface="+mn-cs"/>
+              </a:rPr>
+              <a:t>这看起来像是在暴力破解，显然要比我们的大脑低级。</a:t>
+            </a:r>
+            <a:r>
+              <a:rPr lang="zh-CN" altLang="en-US" dirty="0" smtClean="0"/>
+              <a:t>行为。为了学会区分数字，人脑只需要几十个例子，最多几百个例子。而</a:t>
+            </a:r>
+            <a:r>
+              <a:rPr lang="en-US" altLang="zh-CN" dirty="0" smtClean="0"/>
+              <a:t>CNN</a:t>
+            </a:r>
+            <a:r>
+              <a:rPr lang="zh-CN" altLang="en-US" dirty="0" smtClean="0"/>
+              <a:t>则需要几万个例子才能取得很好的效果。</a:t>
+            </a:r>
+            <a:endParaRPr lang="en-US" dirty="0"/>
           </a:p>
         </p:txBody>
       </p:sp>
@@ -1509,7 +1658,7 @@
     </p:spTree>
     <p:extLst>
       <p:ext uri="{BB962C8B-B14F-4D97-AF65-F5344CB8AC3E}">
-        <p14:creationId xmlns:p14="http://schemas.microsoft.com/office/powerpoint/2010/main" val="429936294"/>
+        <p14:creationId xmlns:p14="http://schemas.microsoft.com/office/powerpoint/2010/main" val="298515564"/>
       </p:ext>
     </p:extLst>
   </p:cSld>
@@ -4432,6 +4581,13 @@
   <p:clrMapOvr>
     <a:masterClrMapping/>
   </p:clrMapOvr>
+  <p:timing>
+    <p:tnLst>
+      <p:par>
+        <p:cTn id="1" dur="indefinite" restart="never" nodeType="tmRoot"/>
+      </p:par>
+    </p:tnLst>
+  </p:timing>
 </p:sld>
 </file>
 
@@ -4468,6 +4624,85 @@
           <a:lstStyle/>
           <a:p>
             <a:r>
+              <a:rPr lang="en-US" altLang="zh-CN" dirty="0" smtClean="0"/>
+              <a:t>DEMO</a:t>
+            </a:r>
+            <a:endParaRPr lang="en-US" dirty="0"/>
+          </a:p>
+        </p:txBody>
+      </p:sp>
+      <p:sp>
+        <p:nvSpPr>
+          <p:cNvPr id="3" name="Content Placeholder 2"/>
+          <p:cNvSpPr>
+            <a:spLocks noGrp="1"/>
+          </p:cNvSpPr>
+          <p:nvPr>
+            <p:ph idx="1"/>
+          </p:nvPr>
+        </p:nvSpPr>
+        <p:spPr/>
+        <p:txBody>
+          <a:bodyPr/>
+          <a:lstStyle/>
+          <a:p>
+            <a:endParaRPr lang="en-US" dirty="0"/>
+          </a:p>
+        </p:txBody>
+      </p:sp>
+    </p:spTree>
+    <p:extLst>
+      <p:ext uri="{BB962C8B-B14F-4D97-AF65-F5344CB8AC3E}">
+        <p14:creationId xmlns:p14="http://schemas.microsoft.com/office/powerpoint/2010/main" val="3429020281"/>
+      </p:ext>
+    </p:extLst>
+  </p:cSld>
+  <p:clrMapOvr>
+    <a:masterClrMapping/>
+  </p:clrMapOvr>
+  <p:timing>
+    <p:tnLst>
+      <p:par>
+        <p:cTn id="1" dur="indefinite" restart="never" nodeType="tmRoot"/>
+      </p:par>
+    </p:tnLst>
+  </p:timing>
+</p:sld>
+</file>
+
+<file path=ppt/slides/slide11.xml><?xml version="1.0" encoding="utf-8"?>
+<p:sld xmlns:a="http://schemas.openxmlformats.org/drawingml/2006/main" xmlns:r="http://schemas.openxmlformats.org/officeDocument/2006/relationships" xmlns:p="http://schemas.openxmlformats.org/presentationml/2006/main">
+  <p:cSld>
+    <p:spTree>
+      <p:nvGrpSpPr>
+        <p:cNvPr id="1" name=""/>
+        <p:cNvGrpSpPr/>
+        <p:nvPr/>
+      </p:nvGrpSpPr>
+      <p:grpSpPr>
+        <a:xfrm>
+          <a:off x="0" y="0"/>
+          <a:ext cx="0" cy="0"/>
+          <a:chOff x="0" y="0"/>
+          <a:chExt cx="0" cy="0"/>
+        </a:xfrm>
+      </p:grpSpPr>
+      <p:sp>
+        <p:nvSpPr>
+          <p:cNvPr id="2" name="Title 1"/>
+          <p:cNvSpPr>
+            <a:spLocks noGrp="1"/>
+          </p:cNvSpPr>
+          <p:nvPr>
+            <p:ph type="title"/>
+          </p:nvPr>
+        </p:nvSpPr>
+        <p:spPr/>
+        <p:txBody>
+          <a:bodyPr/>
+          <a:lstStyle/>
+          <a:p>
+            <a:r>
               <a:rPr lang="zh-CN" altLang="en-US" dirty="0" smtClean="0"/>
               <a:t>参考文献</a:t>
             </a:r>
@@ -4491,10 +4726,45 @@
           <a:lstStyle/>
           <a:p>
             <a:r>
-              <a:rPr lang="en-US" b="1" dirty="0">
+              <a:rPr lang="en-US" altLang="zh-CN" i="1" dirty="0" smtClean="0"/>
+              <a:t>Geoffrey </a:t>
+            </a:r>
+            <a:r>
+              <a:rPr lang="en-US" altLang="zh-CN" i="1" dirty="0"/>
+              <a:t>Hinton talk “</a:t>
+            </a:r>
+            <a:r>
+              <a:rPr lang="en-US" altLang="zh-CN" i="1" dirty="0">
                 <a:hlinkClick r:id="rId3"/>
               </a:rPr>
-              <a:t>Understanding Hinton’s Capsule Networks</a:t>
+              <a:t>What is wrong with convolutional neural nets </a:t>
+            </a:r>
+            <a:r>
+              <a:rPr lang="en-US" altLang="zh-CN" i="1" dirty="0" smtClean="0">
+                <a:hlinkClick r:id="rId3"/>
+              </a:rPr>
+              <a:t>?</a:t>
+            </a:r>
+            <a:r>
+              <a:rPr lang="en-US" altLang="zh-CN" i="1" dirty="0" smtClean="0"/>
+              <a:t>”</a:t>
+            </a:r>
+            <a:endParaRPr lang="en-US" b="1" dirty="0" smtClean="0">
+              <a:hlinkClick r:id="rId4"/>
+            </a:endParaRPr>
+          </a:p>
+          <a:p>
+            <a:r>
+              <a:rPr lang="en-US" b="1" dirty="0" smtClean="0">
+                <a:hlinkClick r:id="rId4"/>
+              </a:rPr>
+              <a:t>Understanding </a:t>
+            </a:r>
+            <a:r>
+              <a:rPr lang="en-US" b="1" dirty="0">
+                <a:hlinkClick r:id="rId4"/>
+              </a:rPr>
+              <a:t>Hinton’s Capsule Networks</a:t>
             </a:r>
             <a:r>
               <a:rPr lang="en-US" b="1" dirty="0"/>
@@ -4522,6 +4792,13 @@
   <p:clrMapOvr>
     <a:masterClrMapping/>
   </p:clrMapOvr>
+  <p:timing>
+    <p:tnLst>
+      <p:par>
+        <p:cTn id="1" dur="indefinite" restart="never" nodeType="tmRoot"/>
+      </p:par>
+    </p:tnLst>
+  </p:timing>
 </p:sld>
 </file>
 
@@ -4665,10 +4942,507 @@
   <p:clrMapOvr>
     <a:masterClrMapping/>
   </p:clrMapOvr>
+  <p:timing>
+    <p:tnLst>
+      <p:par>
+        <p:cTn id="1" dur="indefinite" restart="never" nodeType="tmRoot"/>
+      </p:par>
+    </p:tnLst>
+  </p:timing>
 </p:sld>
 </file>
 
 <file path=ppt/slides/slide3.xml><?xml version="1.0" encoding="utf-8"?>
+<p:sld xmlns:a="http://schemas.openxmlformats.org/drawingml/2006/main" xmlns:r="http://schemas.openxmlformats.org/officeDocument/2006/relationships" xmlns:p="http://schemas.openxmlformats.org/presentationml/2006/main">
+  <p:cSld>
+    <p:spTree>
+      <p:nvGrpSpPr>
+        <p:cNvPr id="1" name=""/>
+        <p:cNvGrpSpPr/>
+        <p:nvPr/>
+      </p:nvGrpSpPr>
+      <p:grpSpPr>
+        <a:xfrm>
+          <a:off x="0" y="0"/>
+          <a:ext cx="0" cy="0"/>
+          <a:chOff x="0" y="0"/>
+          <a:chExt cx="0" cy="0"/>
+        </a:xfrm>
+      </p:grpSpPr>
+      <p:sp>
+        <p:nvSpPr>
+          <p:cNvPr id="2" name="Title 1"/>
+          <p:cNvSpPr>
+            <a:spLocks noGrp="1"/>
+          </p:cNvSpPr>
+          <p:nvPr>
+            <p:ph type="title"/>
+          </p:nvPr>
+        </p:nvSpPr>
+        <p:spPr/>
+        <p:txBody>
+          <a:bodyPr/>
+          <a:lstStyle/>
+          <a:p>
+            <a:r>
+              <a:rPr lang="zh-CN" altLang="en-US" dirty="0"/>
+              <a:t>深度学习三巨头</a:t>
+            </a:r>
+            <a:endParaRPr lang="en-US" dirty="0"/>
+          </a:p>
+        </p:txBody>
+      </p:sp>
+      <p:pic>
+        <p:nvPicPr>
+          <p:cNvPr id="4" name="Picture 3">
+            <a:hlinkClick r:id="rId3"/>
+          </p:cNvPr>
+          <p:cNvPicPr>
+            <a:picLocks noChangeAspect="1"/>
+          </p:cNvPicPr>
+          <p:nvPr/>
+        </p:nvPicPr>
+        <p:blipFill>
+          <a:blip r:embed="rId4"/>
+          <a:stretch>
+            <a:fillRect/>
+          </a:stretch>
+        </p:blipFill>
+        <p:spPr>
+          <a:xfrm>
+            <a:off x="235194" y="3207358"/>
+            <a:ext cx="1733550" cy="1762125"/>
+          </a:xfrm>
+          <a:prstGeom prst="rect">
+            <a:avLst/>
+          </a:prstGeom>
+        </p:spPr>
+      </p:pic>
+      <p:sp>
+        <p:nvSpPr>
+          <p:cNvPr id="5" name="TextBox 4"/>
+          <p:cNvSpPr txBox="1"/>
+          <p:nvPr/>
+        </p:nvSpPr>
+        <p:spPr>
+          <a:xfrm>
+            <a:off x="235194" y="4969483"/>
+            <a:ext cx="1269194" cy="369332"/>
+          </a:xfrm>
+          <a:prstGeom prst="rect">
+            <a:avLst/>
+          </a:prstGeom>
+          <a:noFill/>
+        </p:spPr>
+        <p:txBody>
+          <a:bodyPr wrap="none" rtlCol="0">
+            <a:spAutoFit/>
+          </a:bodyPr>
+          <a:lstStyle/>
+          <a:p>
+            <a:r>
+              <a:rPr lang="en-US" altLang="zh-CN" dirty="0" smtClean="0"/>
+              <a:t>Yan</a:t>
+            </a:r>
+            <a:r>
+              <a:rPr lang="en-US" dirty="0" smtClean="0"/>
+              <a:t>n </a:t>
+            </a:r>
+            <a:r>
+              <a:rPr lang="en-US" dirty="0" err="1" smtClean="0"/>
+              <a:t>LeCun</a:t>
+            </a:r>
+            <a:endParaRPr lang="en-US" dirty="0"/>
+          </a:p>
+        </p:txBody>
+      </p:sp>
+      <p:pic>
+        <p:nvPicPr>
+          <p:cNvPr id="6" name="Picture 5">
+            <a:hlinkClick r:id="rId5"/>
+          </p:cNvPr>
+          <p:cNvPicPr>
+            <a:picLocks noChangeAspect="1"/>
+          </p:cNvPicPr>
+          <p:nvPr/>
+        </p:nvPicPr>
+        <p:blipFill>
+          <a:blip r:embed="rId6"/>
+          <a:stretch>
+            <a:fillRect/>
+          </a:stretch>
+        </p:blipFill>
+        <p:spPr>
+          <a:xfrm>
+            <a:off x="2802549" y="4114429"/>
+            <a:ext cx="1504950" cy="1724025"/>
+          </a:xfrm>
+          <a:prstGeom prst="rect">
+            <a:avLst/>
+          </a:prstGeom>
+        </p:spPr>
+      </p:pic>
+      <p:sp>
+        <p:nvSpPr>
+          <p:cNvPr id="7" name="Rectangle 6"/>
+          <p:cNvSpPr/>
+          <p:nvPr/>
+        </p:nvSpPr>
+        <p:spPr>
+          <a:xfrm>
+            <a:off x="2802549" y="5790069"/>
+            <a:ext cx="1544397" cy="369332"/>
+          </a:xfrm>
+          <a:prstGeom prst="rect">
+            <a:avLst/>
+          </a:prstGeom>
+        </p:spPr>
+        <p:txBody>
+          <a:bodyPr wrap="none">
+            <a:spAutoFit/>
+          </a:bodyPr>
+          <a:lstStyle/>
+          <a:p>
+            <a:r>
+              <a:rPr lang="en-US" dirty="0" err="1"/>
+              <a:t>Yoshua</a:t>
+            </a:r>
+            <a:r>
+              <a:rPr lang="en-US" dirty="0"/>
+              <a:t> </a:t>
+            </a:r>
+            <a:r>
+              <a:rPr lang="en-US" dirty="0" err="1"/>
+              <a:t>Bengio</a:t>
+            </a:r>
+            <a:endParaRPr lang="en-US" dirty="0"/>
+          </a:p>
+        </p:txBody>
+      </p:sp>
+      <p:pic>
+        <p:nvPicPr>
+          <p:cNvPr id="8" name="Picture 7">
+            <a:hlinkClick r:id="rId7"/>
+          </p:cNvPr>
+          <p:cNvPicPr>
+            <a:picLocks noChangeAspect="1"/>
+          </p:cNvPicPr>
+          <p:nvPr/>
+        </p:nvPicPr>
+        <p:blipFill>
+          <a:blip r:embed="rId8"/>
+          <a:stretch>
+            <a:fillRect/>
+          </a:stretch>
+        </p:blipFill>
+        <p:spPr>
+          <a:xfrm>
+            <a:off x="2617910" y="1731411"/>
+            <a:ext cx="1314450" cy="1733550"/>
+          </a:xfrm>
+          <a:prstGeom prst="rect">
+            <a:avLst/>
+          </a:prstGeom>
+        </p:spPr>
+      </p:pic>
+      <p:sp>
+        <p:nvSpPr>
+          <p:cNvPr id="9" name="Rectangle 8"/>
+          <p:cNvSpPr/>
+          <p:nvPr/>
+        </p:nvSpPr>
+        <p:spPr>
+          <a:xfrm>
+            <a:off x="2617910" y="3441563"/>
+            <a:ext cx="1690014" cy="369332"/>
+          </a:xfrm>
+          <a:prstGeom prst="rect">
+            <a:avLst/>
+          </a:prstGeom>
+        </p:spPr>
+        <p:txBody>
+          <a:bodyPr wrap="none">
+            <a:spAutoFit/>
+          </a:bodyPr>
+          <a:lstStyle/>
+          <a:p>
+            <a:r>
+              <a:rPr lang="en-US" dirty="0"/>
+              <a:t>Geoffrey Hinton</a:t>
+            </a:r>
+          </a:p>
+        </p:txBody>
+      </p:sp>
+      <p:sp>
+        <p:nvSpPr>
+          <p:cNvPr id="10" name="Rectangle 9"/>
+          <p:cNvSpPr/>
+          <p:nvPr/>
+        </p:nvSpPr>
+        <p:spPr>
+          <a:xfrm>
+            <a:off x="3932360" y="1731411"/>
+            <a:ext cx="1269515" cy="830997"/>
+          </a:xfrm>
+          <a:prstGeom prst="rect">
+            <a:avLst/>
+          </a:prstGeom>
+        </p:spPr>
+        <p:txBody>
+          <a:bodyPr wrap="none">
+            <a:spAutoFit/>
+          </a:bodyPr>
+          <a:lstStyle/>
+          <a:p>
+            <a:r>
+              <a:rPr lang="en-US" sz="1200" dirty="0"/>
+              <a:t>Back </a:t>
+            </a:r>
+            <a:r>
+              <a:rPr lang="en-US" sz="1200" dirty="0" smtClean="0"/>
+              <a:t>Propagation</a:t>
+            </a:r>
+          </a:p>
+          <a:p>
+            <a:r>
+              <a:rPr lang="en-US" sz="1200" dirty="0" smtClean="0"/>
+              <a:t>RBM</a:t>
+            </a:r>
+          </a:p>
+          <a:p>
+            <a:r>
+              <a:rPr lang="en-US" sz="1200" dirty="0" err="1" smtClean="0"/>
+              <a:t>ReLU</a:t>
+            </a:r>
+            <a:endParaRPr lang="en-US" sz="1200" dirty="0" smtClean="0"/>
+          </a:p>
+          <a:p>
+            <a:r>
+              <a:rPr lang="en-US" sz="1200" dirty="0" smtClean="0"/>
+              <a:t>Dropout</a:t>
+            </a:r>
+            <a:endParaRPr lang="en-US" sz="1200" dirty="0"/>
+          </a:p>
+        </p:txBody>
+      </p:sp>
+      <p:sp>
+        <p:nvSpPr>
+          <p:cNvPr id="11" name="Rectangle 10"/>
+          <p:cNvSpPr/>
+          <p:nvPr/>
+        </p:nvSpPr>
+        <p:spPr>
+          <a:xfrm>
+            <a:off x="2006841" y="4273598"/>
+            <a:ext cx="465192" cy="276999"/>
+          </a:xfrm>
+          <a:prstGeom prst="rect">
+            <a:avLst/>
+          </a:prstGeom>
+        </p:spPr>
+        <p:txBody>
+          <a:bodyPr wrap="none">
+            <a:spAutoFit/>
+          </a:bodyPr>
+          <a:lstStyle/>
+          <a:p>
+            <a:r>
+              <a:rPr lang="en-US" altLang="zh-CN" sz="1200" dirty="0" smtClean="0"/>
+              <a:t>CNN</a:t>
+            </a:r>
+            <a:endParaRPr lang="en-US" dirty="0"/>
+          </a:p>
+        </p:txBody>
+      </p:sp>
+      <p:sp>
+        <p:nvSpPr>
+          <p:cNvPr id="13" name="Rectangle 12"/>
+          <p:cNvSpPr/>
+          <p:nvPr/>
+        </p:nvSpPr>
+        <p:spPr>
+          <a:xfrm>
+            <a:off x="4346946" y="4952318"/>
+            <a:ext cx="795218" cy="646331"/>
+          </a:xfrm>
+          <a:prstGeom prst="rect">
+            <a:avLst/>
+          </a:prstGeom>
+        </p:spPr>
+        <p:txBody>
+          <a:bodyPr wrap="none">
+            <a:spAutoFit/>
+          </a:bodyPr>
+          <a:lstStyle/>
+          <a:p>
+            <a:r>
+              <a:rPr lang="en-US" altLang="zh-CN" sz="1200" dirty="0" smtClean="0"/>
+              <a:t>RNN</a:t>
+            </a:r>
+          </a:p>
+          <a:p>
+            <a:r>
+              <a:rPr lang="en-US" altLang="zh-CN" sz="1200" dirty="0"/>
+              <a:t>w</a:t>
+            </a:r>
+            <a:r>
+              <a:rPr lang="en-US" sz="1200" dirty="0" smtClean="0"/>
+              <a:t>ord2vec</a:t>
+            </a:r>
+          </a:p>
+          <a:p>
+            <a:r>
+              <a:rPr lang="en-US" sz="1200" dirty="0"/>
+              <a:t>CIFAR</a:t>
+            </a:r>
+          </a:p>
+        </p:txBody>
+      </p:sp>
+      <p:sp>
+        <p:nvSpPr>
+          <p:cNvPr id="14" name="TextBox 13"/>
+          <p:cNvSpPr txBox="1"/>
+          <p:nvPr/>
+        </p:nvSpPr>
+        <p:spPr>
+          <a:xfrm>
+            <a:off x="5465350" y="949099"/>
+            <a:ext cx="6726650" cy="3139321"/>
+          </a:xfrm>
+          <a:prstGeom prst="rect">
+            <a:avLst/>
+          </a:prstGeom>
+          <a:noFill/>
+        </p:spPr>
+        <p:txBody>
+          <a:bodyPr wrap="none" rtlCol="0">
+            <a:spAutoFit/>
+          </a:bodyPr>
+          <a:lstStyle/>
+          <a:p>
+            <a:r>
+              <a:rPr lang="en-US" dirty="0" smtClean="0"/>
+              <a:t>“All of these AI systems we see, none of them is ‘real’ AI.</a:t>
+            </a:r>
+          </a:p>
+          <a:p>
+            <a:r>
+              <a:rPr lang="en-US" dirty="0" smtClean="0"/>
+              <a:t>                                          -- Josh </a:t>
+            </a:r>
+            <a:r>
+              <a:rPr lang="en-US" dirty="0" err="1" smtClean="0"/>
+              <a:t>Tennenbaum</a:t>
+            </a:r>
+            <a:r>
+              <a:rPr lang="en-US" dirty="0" smtClean="0"/>
+              <a:t> at CCN 2017</a:t>
+            </a:r>
+          </a:p>
+          <a:p>
+            <a:endParaRPr lang="en-US" dirty="0"/>
+          </a:p>
+          <a:p>
+            <a:endParaRPr lang="en-US" dirty="0" smtClean="0"/>
+          </a:p>
+          <a:p>
+            <a:r>
+              <a:rPr lang="en-US" dirty="0" smtClean="0"/>
+              <a:t>The brain learns with an efficiency that none of our machine</a:t>
+            </a:r>
+          </a:p>
+          <a:p>
+            <a:r>
+              <a:rPr lang="en-US" dirty="0" smtClean="0"/>
+              <a:t> learning methods can match.</a:t>
+            </a:r>
+          </a:p>
+          <a:p>
+            <a:pPr marL="285750" indent="-285750">
+              <a:buFont typeface="Arial" panose="020B0604020202020204" pitchFamily="34" charset="0"/>
+              <a:buChar char="•"/>
+            </a:pPr>
+            <a:r>
+              <a:rPr lang="en-US" dirty="0" smtClean="0"/>
+              <a:t>Out supervised learning system require large numbers of examples</a:t>
+            </a:r>
+          </a:p>
+          <a:p>
+            <a:pPr marL="285750" indent="-285750">
+              <a:buFont typeface="Arial" panose="020B0604020202020204" pitchFamily="34" charset="0"/>
+              <a:buChar char="•"/>
+            </a:pPr>
+            <a:r>
+              <a:rPr lang="en-US" dirty="0" smtClean="0"/>
+              <a:t>Our reinforcement learning systems require millions of trials</a:t>
+            </a:r>
+          </a:p>
+          <a:p>
+            <a:pPr marL="285750" indent="-285750">
+              <a:buFont typeface="Arial" panose="020B0604020202020204" pitchFamily="34" charset="0"/>
+              <a:buChar char="•"/>
+            </a:pPr>
+            <a:r>
+              <a:rPr lang="en-US" dirty="0" smtClean="0"/>
+              <a:t>That’s why we don’t have robots that as agile as a cat or a rat</a:t>
+            </a:r>
+          </a:p>
+          <a:p>
+            <a:pPr marL="285750" indent="-285750">
+              <a:buFont typeface="Arial" panose="020B0604020202020204" pitchFamily="34" charset="0"/>
+              <a:buChar char="•"/>
+            </a:pPr>
+            <a:r>
+              <a:rPr lang="en-US" dirty="0" smtClean="0"/>
+              <a:t>That’s why we don’t have dialog systems that have common sense</a:t>
+            </a:r>
+          </a:p>
+          <a:p>
+            <a:r>
+              <a:rPr lang="en-US" dirty="0"/>
+              <a:t> </a:t>
+            </a:r>
+            <a:r>
+              <a:rPr lang="en-US" dirty="0" smtClean="0"/>
+              <a:t>                                         -- Yan </a:t>
+            </a:r>
+            <a:r>
+              <a:rPr lang="en-US" dirty="0" err="1" smtClean="0"/>
+              <a:t>LeCun</a:t>
+            </a:r>
+            <a:r>
+              <a:rPr lang="en-US" dirty="0" smtClean="0"/>
+              <a:t> </a:t>
+            </a:r>
+            <a:r>
+              <a:rPr lang="en-US" dirty="0"/>
+              <a:t>at CCN 2017</a:t>
+            </a:r>
+            <a:endParaRPr lang="en-US" dirty="0" smtClean="0"/>
+          </a:p>
+        </p:txBody>
+      </p:sp>
+    </p:spTree>
+    <p:extLst>
+      <p:ext uri="{BB962C8B-B14F-4D97-AF65-F5344CB8AC3E}">
+        <p14:creationId xmlns:p14="http://schemas.microsoft.com/office/powerpoint/2010/main" val="3062905923"/>
+      </p:ext>
+    </p:extLst>
+  </p:cSld>
+  <p:clrMapOvr>
+    <a:masterClrMapping/>
+  </p:clrMapOvr>
+  <p:timing>
+    <p:tnLst>
+      <p:par>
+        <p:cTn id="1" dur="indefinite" restart="never" nodeType="tmRoot"/>
+      </p:par>
+    </p:tnLst>
+  </p:timing>
+</p:sld>
+</file>
+
+<file path=ppt/slides/slide4.xml><?xml version="1.0" encoding="utf-8"?>
 <p:sld xmlns:a="http://schemas.openxmlformats.org/drawingml/2006/main" xmlns:r="http://schemas.openxmlformats.org/officeDocument/2006/relationships" xmlns:p="http://schemas.openxmlformats.org/presentationml/2006/main">
   <p:cSld>
     <p:spTree>
@@ -4819,10 +5593,17 @@
   <p:clrMapOvr>
     <a:masterClrMapping/>
   </p:clrMapOvr>
+  <p:timing>
+    <p:tnLst>
+      <p:par>
+        <p:cTn id="1" dur="indefinite" restart="never" nodeType="tmRoot"/>
+      </p:par>
+    </p:tnLst>
+  </p:timing>
 </p:sld>
 </file>
 
-<file path=ppt/slides/slide4.xml><?xml version="1.0" encoding="utf-8"?>
+<file path=ppt/slides/slide5.xml><?xml version="1.0" encoding="utf-8"?>
 <p:sld xmlns:a="http://schemas.openxmlformats.org/drawingml/2006/main" xmlns:r="http://schemas.openxmlformats.org/officeDocument/2006/relationships" xmlns:p="http://schemas.openxmlformats.org/presentationml/2006/main">
   <p:cSld>
     <p:spTree>
@@ -4972,10 +5753,17 @@
   <p:clrMapOvr>
     <a:masterClrMapping/>
   </p:clrMapOvr>
+  <p:timing>
+    <p:tnLst>
+      <p:par>
+        <p:cTn id="1" dur="indefinite" restart="never" nodeType="tmRoot"/>
+      </p:par>
+    </p:tnLst>
+  </p:timing>
 </p:sld>
 </file>
 
-<file path=ppt/slides/slide5.xml><?xml version="1.0" encoding="utf-8"?>
+<file path=ppt/slides/slide6.xml><?xml version="1.0" encoding="utf-8"?>
 <p:sld xmlns:a="http://schemas.openxmlformats.org/drawingml/2006/main" xmlns:r="http://schemas.openxmlformats.org/officeDocument/2006/relationships" xmlns:p="http://schemas.openxmlformats.org/presentationml/2006/main">
   <p:cSld>
     <p:spTree>
@@ -5103,10 +5891,220 @@
   <p:clrMapOvr>
     <a:masterClrMapping/>
   </p:clrMapOvr>
+  <p:timing>
+    <p:tnLst>
+      <p:par>
+        <p:cTn id="1" dur="indefinite" restart="never" nodeType="tmRoot"/>
+      </p:par>
+    </p:tnLst>
+  </p:timing>
 </p:sld>
 </file>
 
-<file path=ppt/slides/slide6.xml><?xml version="1.0" encoding="utf-8"?>
+<file path=ppt/slides/slide7.xml><?xml version="1.0" encoding="utf-8"?>
+<p:sld xmlns:a="http://schemas.openxmlformats.org/drawingml/2006/main" xmlns:r="http://schemas.openxmlformats.org/officeDocument/2006/relationships" xmlns:p="http://schemas.openxmlformats.org/presentationml/2006/main">
+  <p:cSld>
+    <p:spTree>
+      <p:nvGrpSpPr>
+        <p:cNvPr id="1" name=""/>
+        <p:cNvGrpSpPr/>
+        <p:nvPr/>
+      </p:nvGrpSpPr>
+      <p:grpSpPr>
+        <a:xfrm>
+          <a:off x="0" y="0"/>
+          <a:ext cx="0" cy="0"/>
+          <a:chOff x="0" y="0"/>
+          <a:chExt cx="0" cy="0"/>
+        </a:xfrm>
+      </p:grpSpPr>
+      <p:sp>
+        <p:nvSpPr>
+          <p:cNvPr id="2" name="Title 1"/>
+          <p:cNvSpPr>
+            <a:spLocks noGrp="1"/>
+          </p:cNvSpPr>
+          <p:nvPr>
+            <p:ph type="title"/>
+          </p:nvPr>
+        </p:nvSpPr>
+        <p:spPr/>
+        <p:txBody>
+          <a:bodyPr/>
+          <a:lstStyle/>
+          <a:p>
+            <a:r>
+              <a:rPr lang="zh-CN" altLang="en-US" dirty="0"/>
+              <a:t>胶</a:t>
+            </a:r>
+            <a:r>
+              <a:rPr lang="zh-CN" altLang="en-US" dirty="0" smtClean="0"/>
+              <a:t>囊</a:t>
+            </a:r>
+            <a:r>
+              <a:rPr lang="zh-CN" altLang="en-US" dirty="0"/>
+              <a:t>缘起</a:t>
+            </a:r>
+            <a:endParaRPr lang="en-US" dirty="0"/>
+          </a:p>
+        </p:txBody>
+      </p:sp>
+      <p:sp>
+        <p:nvSpPr>
+          <p:cNvPr id="3" name="Content Placeholder 2"/>
+          <p:cNvSpPr>
+            <a:spLocks noGrp="1"/>
+          </p:cNvSpPr>
+          <p:nvPr>
+            <p:ph idx="1"/>
+          </p:nvPr>
+        </p:nvSpPr>
+        <p:spPr>
+          <a:xfrm>
+            <a:off x="838200" y="1825625"/>
+            <a:ext cx="10776438" cy="4351338"/>
+          </a:xfrm>
+        </p:spPr>
+        <p:txBody>
+          <a:bodyPr/>
+          <a:lstStyle/>
+          <a:p>
+            <a:r>
+              <a:rPr lang="en-US" dirty="0" smtClean="0"/>
+              <a:t>Hinton</a:t>
+            </a:r>
+            <a:r>
+              <a:rPr lang="zh-CN" altLang="en-US" dirty="0" smtClean="0"/>
+              <a:t>直觉</a:t>
+            </a:r>
+            <a:r>
+              <a:rPr lang="en-US" altLang="zh-CN" dirty="0" smtClean="0"/>
+              <a:t>:</a:t>
+            </a:r>
+          </a:p>
+          <a:p>
+            <a:pPr lvl="1"/>
+            <a:r>
+              <a:rPr lang="zh-CN" altLang="en-US" dirty="0" smtClean="0"/>
+              <a:t>神经网络中层次太少了（</a:t>
+            </a:r>
+            <a:r>
+              <a:rPr lang="en-US" altLang="zh-CN" dirty="0" smtClean="0"/>
+              <a:t>Neurons, Layers, Whole Nets</a:t>
+            </a:r>
+            <a:r>
+              <a:rPr lang="zh-CN" altLang="en-US" dirty="0" smtClean="0"/>
+              <a:t>）</a:t>
+            </a:r>
+            <a:endParaRPr lang="en-US" altLang="zh-CN" dirty="0" smtClean="0"/>
+          </a:p>
+          <a:p>
+            <a:pPr lvl="1"/>
+            <a:r>
+              <a:rPr lang="zh-CN" altLang="en-US" dirty="0" smtClean="0"/>
+              <a:t>得在层和神经元之间加个层次：“</a:t>
+            </a:r>
+            <a:r>
+              <a:rPr lang="zh-CN" altLang="en-US" dirty="0"/>
+              <a:t>胶囊</a:t>
+            </a:r>
+            <a:r>
+              <a:rPr lang="zh-CN" altLang="en-US" dirty="0" smtClean="0"/>
+              <a:t>”，胶囊有内部结构，输出向量。</a:t>
+            </a:r>
+            <a:endParaRPr lang="en-US" altLang="zh-CN" dirty="0" smtClean="0"/>
+          </a:p>
+          <a:p>
+            <a:r>
+              <a:rPr lang="zh-CN" altLang="en-US" dirty="0"/>
+              <a:t>每</a:t>
+            </a:r>
+            <a:r>
+              <a:rPr lang="zh-CN" altLang="en-US" dirty="0" smtClean="0"/>
+              <a:t>个胶囊探测和感知一个实体。以视觉为例，胶囊输出：</a:t>
+            </a:r>
+            <a:r>
+              <a:rPr lang="en-US" altLang="zh-CN" dirty="0" smtClean="0"/>
+              <a:t>1.</a:t>
+            </a:r>
+            <a:r>
+              <a:rPr lang="zh-CN" altLang="en-US" dirty="0" smtClean="0"/>
+              <a:t>某对象存在的概率；</a:t>
+            </a:r>
+            <a:r>
+              <a:rPr lang="en-US" altLang="zh-CN" dirty="0" smtClean="0"/>
+              <a:t>2.</a:t>
+            </a:r>
+            <a:r>
+              <a:rPr lang="zh-CN" altLang="en-US" dirty="0" smtClean="0"/>
+              <a:t>对象各种属性，如：位置、姿态、缩放、形变、速度、颜色等。</a:t>
+            </a:r>
+            <a:endParaRPr lang="en-US" dirty="0"/>
+          </a:p>
+        </p:txBody>
+      </p:sp>
+      <p:pic>
+        <p:nvPicPr>
+          <p:cNvPr id="6146" name="Picture 2" descr="https://cdn-images-1.medium.com/max/2000/1*gkRl9_6LK9ZqNF0ttv2kFA.jpeg"/>
+          <p:cNvPicPr>
+            <a:picLocks noChangeAspect="1" noChangeArrowheads="1"/>
+          </p:cNvPicPr>
+          <p:nvPr/>
+        </p:nvPicPr>
+        <p:blipFill>
+          <a:blip r:embed="rId3" cstate="print">
+            <a:extLst>
+              <a:ext uri="{28A0092B-C50C-407E-A947-70E740481C1C}">
+                <a14:useLocalDpi xmlns:a14="http://schemas.microsoft.com/office/drawing/2010/main" val="0"/>
+              </a:ext>
+            </a:extLst>
+          </a:blip>
+          <a:srcRect/>
+          <a:stretch>
+            <a:fillRect/>
+          </a:stretch>
+        </p:blipFill>
+        <p:spPr bwMode="auto">
+          <a:xfrm>
+            <a:off x="2883167" y="4713181"/>
+            <a:ext cx="6286500" cy="1816799"/>
+          </a:xfrm>
+          <a:prstGeom prst="rect">
+            <a:avLst/>
+          </a:prstGeom>
+          <a:noFill/>
+          <a:extLst>
+            <a:ext uri="{909E8E84-426E-40DD-AFC4-6F175D3DCCD1}">
+              <a14:hiddenFill xmlns:a14="http://schemas.microsoft.com/office/drawing/2010/main">
+                <a:solidFill>
+                  <a:srgbClr val="FFFFFF"/>
+                </a:solidFill>
+              </a14:hiddenFill>
+            </a:ext>
+          </a:extLst>
+        </p:spPr>
+      </p:pic>
+    </p:spTree>
+    <p:extLst>
+      <p:ext uri="{BB962C8B-B14F-4D97-AF65-F5344CB8AC3E}">
+        <p14:creationId xmlns:p14="http://schemas.microsoft.com/office/powerpoint/2010/main" val="333583485"/>
+      </p:ext>
+    </p:extLst>
+  </p:cSld>
+  <p:clrMapOvr>
+    <a:masterClrMapping/>
+  </p:clrMapOvr>
+  <p:timing>
+    <p:tnLst>
+      <p:par>
+        <p:cTn id="1" dur="indefinite" restart="never" nodeType="tmRoot"/>
+      </p:par>
+    </p:tnLst>
+  </p:timing>
+</p:sld>
+</file>
+
+<file path=ppt/slides/slide8.xml><?xml version="1.0" encoding="utf-8"?>
 <p:sld xmlns:a="http://schemas.openxmlformats.org/drawingml/2006/main" xmlns:r="http://schemas.openxmlformats.org/officeDocument/2006/relationships" xmlns:p="http://schemas.openxmlformats.org/presentationml/2006/main">
   <p:cSld>
     <p:spTree>
@@ -5231,119 +6229,17 @@
   <p:clrMapOvr>
     <a:masterClrMapping/>
   </p:clrMapOvr>
+  <p:timing>
+    <p:tnLst>
+      <p:par>
+        <p:cTn id="1" dur="indefinite" restart="never" nodeType="tmRoot"/>
+      </p:par>
+    </p:tnLst>
+  </p:timing>
 </p:sld>
 </file>
 
-<file path=ppt/slides/slide7.xml><?xml version="1.0" encoding="utf-8"?>
-<p:sld xmlns:a="http://schemas.openxmlformats.org/drawingml/2006/main" xmlns:r="http://schemas.openxmlformats.org/officeDocument/2006/relationships" xmlns:p="http://schemas.openxmlformats.org/presentationml/2006/main">
-  <p:cSld>
-    <p:spTree>
-      <p:nvGrpSpPr>
-        <p:cNvPr id="1" name=""/>
-        <p:cNvGrpSpPr/>
-        <p:nvPr/>
-      </p:nvGrpSpPr>
-      <p:grpSpPr>
-        <a:xfrm>
-          <a:off x="0" y="0"/>
-          <a:ext cx="0" cy="0"/>
-          <a:chOff x="0" y="0"/>
-          <a:chExt cx="0" cy="0"/>
-        </a:xfrm>
-      </p:grpSpPr>
-      <p:sp>
-        <p:nvSpPr>
-          <p:cNvPr id="2" name="Title 1"/>
-          <p:cNvSpPr>
-            <a:spLocks noGrp="1"/>
-          </p:cNvSpPr>
-          <p:nvPr>
-            <p:ph type="title"/>
-          </p:nvPr>
-        </p:nvSpPr>
-        <p:spPr/>
-        <p:txBody>
-          <a:bodyPr/>
-          <a:lstStyle/>
-          <a:p>
-            <a:endParaRPr lang="en-US"/>
-          </a:p>
-        </p:txBody>
-      </p:sp>
-      <p:sp>
-        <p:nvSpPr>
-          <p:cNvPr id="3" name="Content Placeholder 2"/>
-          <p:cNvSpPr>
-            <a:spLocks noGrp="1"/>
-          </p:cNvSpPr>
-          <p:nvPr>
-            <p:ph idx="1"/>
-          </p:nvPr>
-        </p:nvSpPr>
-        <p:spPr/>
-        <p:txBody>
-          <a:bodyPr/>
-          <a:lstStyle/>
-          <a:p>
-            <a:endParaRPr lang="en-US"/>
-          </a:p>
-        </p:txBody>
-      </p:sp>
-      <p:pic>
-        <p:nvPicPr>
-          <p:cNvPr id="6146" name="Picture 2" descr="https://cdn-images-1.medium.com/max/2000/1*gkRl9_6LK9ZqNF0ttv2kFA.jpeg"/>
-          <p:cNvPicPr>
-            <a:picLocks noChangeAspect="1" noChangeArrowheads="1"/>
-          </p:cNvPicPr>
-          <p:nvPr/>
-        </p:nvPicPr>
-        <p:blipFill>
-          <a:blip r:embed="rId3">
-            <a:extLst>
-              <a:ext uri="{28A0092B-C50C-407E-A947-70E740481C1C}">
-                <a14:useLocalDpi xmlns:a14="http://schemas.microsoft.com/office/drawing/2010/main" val="0"/>
-              </a:ext>
-            </a:extLst>
-          </a:blip>
-          <a:srcRect/>
-          <a:stretch>
-            <a:fillRect/>
-          </a:stretch>
-        </p:blipFill>
-        <p:spPr bwMode="auto">
-          <a:xfrm>
-            <a:off x="1333500" y="3875783"/>
-            <a:ext cx="9525000" cy="2752725"/>
-          </a:xfrm>
-          <a:prstGeom prst="rect">
-            <a:avLst/>
-          </a:prstGeom>
-          <a:noFill/>
-          <a:extLst>
-            <a:ext uri="{909E8E84-426E-40DD-AFC4-6F175D3DCCD1}">
-              <a14:hiddenFill xmlns:a14="http://schemas.microsoft.com/office/drawing/2010/main">
-                <a:solidFill>
-                  <a:srgbClr val="FFFFFF"/>
-                </a:solidFill>
-              </a14:hiddenFill>
-            </a:ext>
-          </a:extLst>
-        </p:spPr>
-      </p:pic>
-    </p:spTree>
-    <p:extLst>
-      <p:ext uri="{BB962C8B-B14F-4D97-AF65-F5344CB8AC3E}">
-        <p14:creationId xmlns:p14="http://schemas.microsoft.com/office/powerpoint/2010/main" val="333583485"/>
-      </p:ext>
-    </p:extLst>
-  </p:cSld>
-  <p:clrMapOvr>
-    <a:masterClrMapping/>
-  </p:clrMapOvr>
-</p:sld>
-</file>
-
-<file path=ppt/slides/slide8.xml><?xml version="1.0" encoding="utf-8"?>
+<file path=ppt/slides/slide9.xml><?xml version="1.0" encoding="utf-8"?>
 <p:sld xmlns:a="http://schemas.openxmlformats.org/drawingml/2006/main" xmlns:r="http://schemas.openxmlformats.org/officeDocument/2006/relationships" xmlns:p="http://schemas.openxmlformats.org/presentationml/2006/main">
   <p:cSld>
     <p:spTree>
@@ -5530,78 +6426,13 @@
   <p:clrMapOvr>
     <a:masterClrMapping/>
   </p:clrMapOvr>
-</p:sld>
-</file>
-
-<file path=ppt/slides/slide9.xml><?xml version="1.0" encoding="utf-8"?>
-<p:sld xmlns:a="http://schemas.openxmlformats.org/drawingml/2006/main" xmlns:r="http://schemas.openxmlformats.org/officeDocument/2006/relationships" xmlns:p="http://schemas.openxmlformats.org/presentationml/2006/main">
-  <p:cSld>
-    <p:spTree>
-      <p:nvGrpSpPr>
-        <p:cNvPr id="1" name=""/>
-        <p:cNvGrpSpPr/>
-        <p:nvPr/>
-      </p:nvGrpSpPr>
-      <p:grpSpPr>
-        <a:xfrm>
-          <a:off x="0" y="0"/>
-          <a:ext cx="0" cy="0"/>
-          <a:chOff x="0" y="0"/>
-          <a:chExt cx="0" cy="0"/>
-        </a:xfrm>
-      </p:grpSpPr>
-      <p:sp>
-        <p:nvSpPr>
-          <p:cNvPr id="2" name="Title 1"/>
-          <p:cNvSpPr>
-            <a:spLocks noGrp="1"/>
-          </p:cNvSpPr>
-          <p:nvPr>
-            <p:ph type="title"/>
-          </p:nvPr>
-        </p:nvSpPr>
-        <p:spPr/>
-        <p:txBody>
-          <a:bodyPr/>
-          <a:lstStyle/>
-          <a:p>
-            <a:r>
-              <a:rPr lang="en-US" altLang="zh-CN" dirty="0" smtClean="0"/>
-              <a:t>DEMO</a:t>
-            </a:r>
-            <a:endParaRPr lang="en-US" dirty="0"/>
-          </a:p>
-        </p:txBody>
-      </p:sp>
-      <p:sp>
-        <p:nvSpPr>
-          <p:cNvPr id="3" name="Content Placeholder 2"/>
-          <p:cNvSpPr>
-            <a:spLocks noGrp="1"/>
-          </p:cNvSpPr>
-          <p:nvPr>
-            <p:ph idx="1"/>
-          </p:nvPr>
-        </p:nvSpPr>
-        <p:spPr/>
-        <p:txBody>
-          <a:bodyPr/>
-          <a:lstStyle/>
-          <a:p>
-            <a:endParaRPr lang="en-US" dirty="0"/>
-          </a:p>
-        </p:txBody>
-      </p:sp>
-    </p:spTree>
-    <p:extLst>
-      <p:ext uri="{BB962C8B-B14F-4D97-AF65-F5344CB8AC3E}">
-        <p14:creationId xmlns:p14="http://schemas.microsoft.com/office/powerpoint/2010/main" val="3429020281"/>
-      </p:ext>
-    </p:extLst>
-  </p:cSld>
-  <p:clrMapOvr>
-    <a:masterClrMapping/>
-  </p:clrMapOvr>
+  <p:timing>
+    <p:tnLst>
+      <p:par>
+        <p:cTn id="1" dur="indefinite" restart="never" nodeType="tmRoot"/>
+      </p:par>
+    </p:tnLst>
+  </p:timing>
 </p:sld>
 </file>
 

</xml_diff>